<commit_message>
styling and finishing leaderboard
</commit_message>
<xml_diff>
--- a/WouldYouRather_planning_design.pptx
+++ b/WouldYouRather_planning_design.pptx
@@ -267,7 +267,7 @@
           <a:p>
             <a:fld id="{86BB709C-C7D8-9749-8C8B-51F01FBE92AD}" type="datetimeFigureOut">
               <a:rPr lang="es-ES" smtClean="0"/>
-              <a:t>12/1/19</a:t>
+              <a:t>13/1/19</a:t>
             </a:fld>
             <a:endParaRPr lang="es-ES"/>
           </a:p>
@@ -440,7 +440,7 @@
           <a:p>
             <a:fld id="{86BB709C-C7D8-9749-8C8B-51F01FBE92AD}" type="datetimeFigureOut">
               <a:rPr lang="es-ES" smtClean="0"/>
-              <a:t>12/1/19</a:t>
+              <a:t>13/1/19</a:t>
             </a:fld>
             <a:endParaRPr lang="es-ES"/>
           </a:p>
@@ -623,7 +623,7 @@
           <a:p>
             <a:fld id="{86BB709C-C7D8-9749-8C8B-51F01FBE92AD}" type="datetimeFigureOut">
               <a:rPr lang="es-ES" smtClean="0"/>
-              <a:t>12/1/19</a:t>
+              <a:t>13/1/19</a:t>
             </a:fld>
             <a:endParaRPr lang="es-ES"/>
           </a:p>
@@ -796,7 +796,7 @@
           <a:p>
             <a:fld id="{86BB709C-C7D8-9749-8C8B-51F01FBE92AD}" type="datetimeFigureOut">
               <a:rPr lang="es-ES" smtClean="0"/>
-              <a:t>12/1/19</a:t>
+              <a:t>13/1/19</a:t>
             </a:fld>
             <a:endParaRPr lang="es-ES"/>
           </a:p>
@@ -1074,7 +1074,7 @@
           <a:p>
             <a:fld id="{86BB709C-C7D8-9749-8C8B-51F01FBE92AD}" type="datetimeFigureOut">
               <a:rPr lang="es-ES" smtClean="0"/>
-              <a:t>12/1/19</a:t>
+              <a:t>13/1/19</a:t>
             </a:fld>
             <a:endParaRPr lang="es-ES"/>
           </a:p>
@@ -1289,7 +1289,7 @@
           <a:p>
             <a:fld id="{86BB709C-C7D8-9749-8C8B-51F01FBE92AD}" type="datetimeFigureOut">
               <a:rPr lang="es-ES" smtClean="0"/>
-              <a:t>12/1/19</a:t>
+              <a:t>13/1/19</a:t>
             </a:fld>
             <a:endParaRPr lang="es-ES"/>
           </a:p>
@@ -1657,7 +1657,7 @@
           <a:p>
             <a:fld id="{86BB709C-C7D8-9749-8C8B-51F01FBE92AD}" type="datetimeFigureOut">
               <a:rPr lang="es-ES" smtClean="0"/>
-              <a:t>12/1/19</a:t>
+              <a:t>13/1/19</a:t>
             </a:fld>
             <a:endParaRPr lang="es-ES"/>
           </a:p>
@@ -1798,7 +1798,7 @@
           <a:p>
             <a:fld id="{86BB709C-C7D8-9749-8C8B-51F01FBE92AD}" type="datetimeFigureOut">
               <a:rPr lang="es-ES" smtClean="0"/>
-              <a:t>12/1/19</a:t>
+              <a:t>13/1/19</a:t>
             </a:fld>
             <a:endParaRPr lang="es-ES"/>
           </a:p>
@@ -1911,7 +1911,7 @@
           <a:p>
             <a:fld id="{86BB709C-C7D8-9749-8C8B-51F01FBE92AD}" type="datetimeFigureOut">
               <a:rPr lang="es-ES" smtClean="0"/>
-              <a:t>12/1/19</a:t>
+              <a:t>13/1/19</a:t>
             </a:fld>
             <a:endParaRPr lang="es-ES"/>
           </a:p>
@@ -2200,7 +2200,7 @@
           <a:p>
             <a:fld id="{86BB709C-C7D8-9749-8C8B-51F01FBE92AD}" type="datetimeFigureOut">
               <a:rPr lang="es-ES" smtClean="0"/>
-              <a:t>12/1/19</a:t>
+              <a:t>13/1/19</a:t>
             </a:fld>
             <a:endParaRPr lang="es-ES"/>
           </a:p>
@@ -2491,7 +2491,7 @@
           <a:p>
             <a:fld id="{86BB709C-C7D8-9749-8C8B-51F01FBE92AD}" type="datetimeFigureOut">
               <a:rPr lang="es-ES" smtClean="0"/>
-              <a:t>12/1/19</a:t>
+              <a:t>13/1/19</a:t>
             </a:fld>
             <a:endParaRPr lang="es-ES"/>
           </a:p>
@@ -2707,7 +2707,7 @@
           <a:p>
             <a:fld id="{86BB709C-C7D8-9749-8C8B-51F01FBE92AD}" type="datetimeFigureOut">
               <a:rPr lang="es-ES" smtClean="0"/>
-              <a:t>12/1/19</a:t>
+              <a:t>13/1/19</a:t>
             </a:fld>
             <a:endParaRPr lang="es-ES"/>
           </a:p>
@@ -5900,115 +5900,6 @@
           </a:p>
         </p:txBody>
       </p:sp>
-      <p:sp>
-        <p:nvSpPr>
-          <p:cNvPr id="10" name="Rectángulo 9">
-            <a:extLst>
-              <a:ext uri="{FF2B5EF4-FFF2-40B4-BE49-F238E27FC236}">
-                <a16:creationId xmlns:a16="http://schemas.microsoft.com/office/drawing/2014/main" id="{A41755A9-C9F1-D742-BEB5-42368A26A4D2}"/>
-              </a:ext>
-            </a:extLst>
-          </p:cNvPr>
-          <p:cNvSpPr/>
-          <p:nvPr/>
-        </p:nvSpPr>
-        <p:spPr>
-          <a:xfrm>
-            <a:off x="7282701" y="2246758"/>
-            <a:ext cx="857689" cy="1182242"/>
-          </a:xfrm>
-          <a:prstGeom prst="rect">
-            <a:avLst/>
-          </a:prstGeom>
-          <a:noFill/>
-          <a:ln w="38100">
-            <a:solidFill>
-              <a:schemeClr val="accent2"/>
-            </a:solidFill>
-          </a:ln>
-        </p:spPr>
-        <p:style>
-          <a:lnRef idx="2">
-            <a:schemeClr val="accent1">
-              <a:shade val="50000"/>
-            </a:schemeClr>
-          </a:lnRef>
-          <a:fillRef idx="1">
-            <a:schemeClr val="accent1"/>
-          </a:fillRef>
-          <a:effectRef idx="0">
-            <a:schemeClr val="accent1"/>
-          </a:effectRef>
-          <a:fontRef idx="minor">
-            <a:schemeClr val="lt1"/>
-          </a:fontRef>
-        </p:style>
-        <p:txBody>
-          <a:bodyPr rtlCol="0" anchor="ctr"/>
-          <a:lstStyle/>
-          <a:p>
-            <a:pPr algn="ctr"/>
-            <a:endParaRPr lang="es-ES"/>
-          </a:p>
-        </p:txBody>
-      </p:sp>
-      <p:sp>
-        <p:nvSpPr>
-          <p:cNvPr id="11" name="CuadroTexto 10">
-            <a:extLst>
-              <a:ext uri="{FF2B5EF4-FFF2-40B4-BE49-F238E27FC236}">
-                <a16:creationId xmlns:a16="http://schemas.microsoft.com/office/drawing/2014/main" id="{B4D79981-E987-1A47-B43E-6D8E6E9AEC9B}"/>
-              </a:ext>
-            </a:extLst>
-          </p:cNvPr>
-          <p:cNvSpPr txBox="1"/>
-          <p:nvPr/>
-        </p:nvSpPr>
-        <p:spPr>
-          <a:xfrm>
-            <a:off x="8140390" y="2244958"/>
-            <a:ext cx="1833194" cy="369332"/>
-          </a:xfrm>
-          <a:prstGeom prst="rect">
-            <a:avLst/>
-          </a:prstGeom>
-          <a:noFill/>
-          <a:ln w="38100">
-            <a:solidFill>
-              <a:schemeClr val="accent2"/>
-            </a:solidFill>
-          </a:ln>
-        </p:spPr>
-        <p:txBody>
-          <a:bodyPr wrap="none" rtlCol="0">
-            <a:spAutoFit/>
-          </a:bodyPr>
-          <a:lstStyle/>
-          <a:p>
-            <a:r>
-              <a:rPr lang="es-ES" dirty="0">
-                <a:solidFill>
-                  <a:schemeClr val="accent2"/>
-                </a:solidFill>
-              </a:rPr>
-              <a:t>Score </a:t>
-            </a:r>
-            <a:r>
-              <a:rPr lang="es-ES" dirty="0" err="1">
-                <a:solidFill>
-                  <a:schemeClr val="accent2"/>
-                </a:solidFill>
-              </a:rPr>
-              <a:t>component</a:t>
-            </a:r>
-            <a:endParaRPr lang="es-ES" dirty="0">
-              <a:solidFill>
-                <a:schemeClr val="accent2"/>
-              </a:solidFill>
-            </a:endParaRPr>
-          </a:p>
-        </p:txBody>
-      </p:sp>
     </p:spTree>
     <p:extLst>
       <p:ext uri="{BB962C8B-B14F-4D97-AF65-F5344CB8AC3E}">

</xml_diff>

<commit_message>
style: customizing PageNotFound with an Image
</commit_message>
<xml_diff>
--- a/WouldYouRather_planning_design.pptx
+++ b/WouldYouRather_planning_design.pptx
@@ -267,7 +267,7 @@
           <a:p>
             <a:fld id="{86BB709C-C7D8-9749-8C8B-51F01FBE92AD}" type="datetimeFigureOut">
               <a:rPr lang="es-ES" smtClean="0"/>
-              <a:t>13/1/19</a:t>
+              <a:t>21/1/19</a:t>
             </a:fld>
             <a:endParaRPr lang="es-ES"/>
           </a:p>
@@ -440,7 +440,7 @@
           <a:p>
             <a:fld id="{86BB709C-C7D8-9749-8C8B-51F01FBE92AD}" type="datetimeFigureOut">
               <a:rPr lang="es-ES" smtClean="0"/>
-              <a:t>13/1/19</a:t>
+              <a:t>21/1/19</a:t>
             </a:fld>
             <a:endParaRPr lang="es-ES"/>
           </a:p>
@@ -623,7 +623,7 @@
           <a:p>
             <a:fld id="{86BB709C-C7D8-9749-8C8B-51F01FBE92AD}" type="datetimeFigureOut">
               <a:rPr lang="es-ES" smtClean="0"/>
-              <a:t>13/1/19</a:t>
+              <a:t>21/1/19</a:t>
             </a:fld>
             <a:endParaRPr lang="es-ES"/>
           </a:p>
@@ -796,7 +796,7 @@
           <a:p>
             <a:fld id="{86BB709C-C7D8-9749-8C8B-51F01FBE92AD}" type="datetimeFigureOut">
               <a:rPr lang="es-ES" smtClean="0"/>
-              <a:t>13/1/19</a:t>
+              <a:t>21/1/19</a:t>
             </a:fld>
             <a:endParaRPr lang="es-ES"/>
           </a:p>
@@ -1074,7 +1074,7 @@
           <a:p>
             <a:fld id="{86BB709C-C7D8-9749-8C8B-51F01FBE92AD}" type="datetimeFigureOut">
               <a:rPr lang="es-ES" smtClean="0"/>
-              <a:t>13/1/19</a:t>
+              <a:t>21/1/19</a:t>
             </a:fld>
             <a:endParaRPr lang="es-ES"/>
           </a:p>
@@ -1289,7 +1289,7 @@
           <a:p>
             <a:fld id="{86BB709C-C7D8-9749-8C8B-51F01FBE92AD}" type="datetimeFigureOut">
               <a:rPr lang="es-ES" smtClean="0"/>
-              <a:t>13/1/19</a:t>
+              <a:t>21/1/19</a:t>
             </a:fld>
             <a:endParaRPr lang="es-ES"/>
           </a:p>
@@ -1657,7 +1657,7 @@
           <a:p>
             <a:fld id="{86BB709C-C7D8-9749-8C8B-51F01FBE92AD}" type="datetimeFigureOut">
               <a:rPr lang="es-ES" smtClean="0"/>
-              <a:t>13/1/19</a:t>
+              <a:t>21/1/19</a:t>
             </a:fld>
             <a:endParaRPr lang="es-ES"/>
           </a:p>
@@ -1798,7 +1798,7 @@
           <a:p>
             <a:fld id="{86BB709C-C7D8-9749-8C8B-51F01FBE92AD}" type="datetimeFigureOut">
               <a:rPr lang="es-ES" smtClean="0"/>
-              <a:t>13/1/19</a:t>
+              <a:t>21/1/19</a:t>
             </a:fld>
             <a:endParaRPr lang="es-ES"/>
           </a:p>
@@ -1911,7 +1911,7 @@
           <a:p>
             <a:fld id="{86BB709C-C7D8-9749-8C8B-51F01FBE92AD}" type="datetimeFigureOut">
               <a:rPr lang="es-ES" smtClean="0"/>
-              <a:t>13/1/19</a:t>
+              <a:t>21/1/19</a:t>
             </a:fld>
             <a:endParaRPr lang="es-ES"/>
           </a:p>
@@ -2200,7 +2200,7 @@
           <a:p>
             <a:fld id="{86BB709C-C7D8-9749-8C8B-51F01FBE92AD}" type="datetimeFigureOut">
               <a:rPr lang="es-ES" smtClean="0"/>
-              <a:t>13/1/19</a:t>
+              <a:t>21/1/19</a:t>
             </a:fld>
             <a:endParaRPr lang="es-ES"/>
           </a:p>
@@ -2491,7 +2491,7 @@
           <a:p>
             <a:fld id="{86BB709C-C7D8-9749-8C8B-51F01FBE92AD}" type="datetimeFigureOut">
               <a:rPr lang="es-ES" smtClean="0"/>
-              <a:t>13/1/19</a:t>
+              <a:t>21/1/19</a:t>
             </a:fld>
             <a:endParaRPr lang="es-ES"/>
           </a:p>
@@ -2707,7 +2707,7 @@
           <a:p>
             <a:fld id="{86BB709C-C7D8-9749-8C8B-51F01FBE92AD}" type="datetimeFigureOut">
               <a:rPr lang="es-ES" smtClean="0"/>
-              <a:t>13/1/19</a:t>
+              <a:t>21/1/19</a:t>
             </a:fld>
             <a:endParaRPr lang="es-ES"/>
           </a:p>
@@ -3377,7 +3377,7 @@
         <p:spPr>
           <a:xfrm>
             <a:off x="5229072" y="4653579"/>
-            <a:ext cx="2435923" cy="369332"/>
+            <a:ext cx="2521716" cy="369332"/>
           </a:xfrm>
           <a:prstGeom prst="rect">
             <a:avLst/>
@@ -3428,20 +3428,12 @@
               <a:t> of </a:t>
             </a:r>
             <a:r>
-              <a:rPr lang="es-ES" dirty="0" err="1">
-                <a:solidFill>
-                  <a:srgbClr val="C00000"/>
-                </a:solidFill>
-              </a:rPr>
-              <a:t>user</a:t>
-            </a:r>
-            <a:r>
-              <a:rPr lang="es-ES" dirty="0">
-                <a:solidFill>
-                  <a:srgbClr val="C00000"/>
-                </a:solidFill>
-              </a:rPr>
-              <a:t> </a:t>
+              <a:rPr lang="es-ES">
+                <a:solidFill>
+                  <a:srgbClr val="C00000"/>
+                </a:solidFill>
+              </a:rPr>
+              <a:t>users </a:t>
             </a:r>
             <a:r>
               <a:rPr lang="es-ES" dirty="0" err="1">

</xml_diff>